<commit_message>
more references to genAI
</commit_message>
<xml_diff>
--- a/mlws_resources/exercise_industry_spotlights_template.pptx
+++ b/mlws_resources/exercise_industry_spotlights_template.pptx
@@ -4952,7 +4952,7 @@
                 <a:cs typeface="Source Sans Pro"/>
                 <a:sym typeface="Source Sans Pro"/>
               </a:rPr>
-              <a:t>Deep Learning</a:t>
+              <a:t>Generative AI</a:t>
             </a:r>
             <a:r>
               <a:rPr lang="en" sz="1200">
@@ -4961,7 +4961,7 @@
                 <a:cs typeface="Source Sans Pro"/>
                 <a:sym typeface="Source Sans Pro"/>
               </a:rPr>
-              <a:t>: </a:t>
+              <a:t>:</a:t>
             </a:r>
             <a:r>
               <a:rPr lang="en" sz="1200">
@@ -4970,7 +4970,7 @@
                 <a:cs typeface="Source Sans Pro"/>
                 <a:sym typeface="Source Sans Pro"/>
               </a:rPr>
-              <a:t>other (e.g., image, text, …): </a:t>
+              <a:t> (e.g., image, text, …): </a:t>
             </a:r>
             <a:r>
               <a:rPr lang="en" sz="1200">

</xml_diff>